<commit_message>
cleanup; partial evaluation work;
</commit_message>
<xml_diff>
--- a/IEnumerable considered harmful.pptx
+++ b/IEnumerable considered harmful.pptx
@@ -7,6 +7,8 @@
   <p:sldIdLst>
     <p:sldId id="256" r:id="rId2"/>
     <p:sldId id="257" r:id="rId3"/>
+    <p:sldId id="259" r:id="rId4"/>
+    <p:sldId id="258" r:id="rId5"/>
   </p:sldIdLst>
   <p:sldSz cx="12192000" cy="6858000"/>
   <p:notesSz cx="6858000" cy="9144000"/>
@@ -105,7 +107,16 @@
       </a:defRPr>
     </a:lvl9pPr>
   </p:defaultTextStyle>
+  <p:extLst>
+    <p:ext uri="{EFAFB233-063F-42B5-8137-9DF3F51BA10A}">
+      <p15:sldGuideLst xmlns:p15="http://schemas.microsoft.com/office/powerpoint/2012/main"/>
+    </p:ext>
+  </p:extLst>
 </p:presentation>
+</file>
+
+<file path=ppt/revisionInfo.xml><?xml version="1.0" encoding="utf-8"?>
+<p1510:revInfo xmlns:a="http://schemas.openxmlformats.org/drawingml/2006/main" xmlns:r="http://schemas.openxmlformats.org/officeDocument/2006/relationships" xmlns:p1510="http://schemas.microsoft.com/office/powerpoint/2015/10/main"/>
 </file>
 
 <file path=ppt/slideLayouts/slideLayout1.xml><?xml version="1.0" encoding="utf-8"?>
@@ -257,7 +268,7 @@
           <a:p>
             <a:fld id="{B304424B-6627-481F-B88A-69358BD4EC9F}" type="datetimeFigureOut">
               <a:rPr lang="en-US" smtClean="0"/>
-              <a:t>10/2/2017</a:t>
+              <a:t>10/7/2017</a:t>
             </a:fld>
             <a:endParaRPr lang="en-US"/>
           </a:p>
@@ -455,7 +466,7 @@
           <a:p>
             <a:fld id="{B304424B-6627-481F-B88A-69358BD4EC9F}" type="datetimeFigureOut">
               <a:rPr lang="en-US" smtClean="0"/>
-              <a:t>10/2/2017</a:t>
+              <a:t>10/7/2017</a:t>
             </a:fld>
             <a:endParaRPr lang="en-US"/>
           </a:p>
@@ -663,7 +674,7 @@
           <a:p>
             <a:fld id="{B304424B-6627-481F-B88A-69358BD4EC9F}" type="datetimeFigureOut">
               <a:rPr lang="en-US" smtClean="0"/>
-              <a:t>10/2/2017</a:t>
+              <a:t>10/7/2017</a:t>
             </a:fld>
             <a:endParaRPr lang="en-US"/>
           </a:p>
@@ -861,7 +872,7 @@
           <a:p>
             <a:fld id="{B304424B-6627-481F-B88A-69358BD4EC9F}" type="datetimeFigureOut">
               <a:rPr lang="en-US" smtClean="0"/>
-              <a:t>10/2/2017</a:t>
+              <a:t>10/7/2017</a:t>
             </a:fld>
             <a:endParaRPr lang="en-US"/>
           </a:p>
@@ -1136,7 +1147,7 @@
           <a:p>
             <a:fld id="{B304424B-6627-481F-B88A-69358BD4EC9F}" type="datetimeFigureOut">
               <a:rPr lang="en-US" smtClean="0"/>
-              <a:t>10/2/2017</a:t>
+              <a:t>10/7/2017</a:t>
             </a:fld>
             <a:endParaRPr lang="en-US"/>
           </a:p>
@@ -1401,7 +1412,7 @@
           <a:p>
             <a:fld id="{B304424B-6627-481F-B88A-69358BD4EC9F}" type="datetimeFigureOut">
               <a:rPr lang="en-US" smtClean="0"/>
-              <a:t>10/2/2017</a:t>
+              <a:t>10/7/2017</a:t>
             </a:fld>
             <a:endParaRPr lang="en-US"/>
           </a:p>
@@ -1551,7 +1562,7 @@
           <a:lstStyle>
             <a:lvl1pPr marL="0" indent="0">
               <a:buNone/>
-              <a:defRPr sz="2400" b="1"/>
+              <a:defRPr sz="3200" b="1"/>
             </a:lvl1pPr>
             <a:lvl2pPr marL="457200" indent="0">
               <a:buNone/>
@@ -1589,7 +1600,7 @@
           <a:p>
             <a:pPr lvl="0"/>
             <a:r>
-              <a:rPr lang="en-US"/>
+              <a:rPr lang="en-US" dirty="0"/>
               <a:t>Edit Master text styles</a:t>
             </a:r>
           </a:p>
@@ -1684,7 +1695,7 @@
           <a:lstStyle>
             <a:lvl1pPr marL="0" indent="0">
               <a:buNone/>
-              <a:defRPr sz="2400" b="1"/>
+              <a:defRPr sz="3200" b="1"/>
             </a:lvl1pPr>
             <a:lvl2pPr marL="457200" indent="0">
               <a:buNone/>
@@ -1722,7 +1733,7 @@
           <a:p>
             <a:pPr lvl="0"/>
             <a:r>
-              <a:rPr lang="en-US"/>
+              <a:rPr lang="en-US" dirty="0"/>
               <a:t>Edit Master text styles</a:t>
             </a:r>
           </a:p>
@@ -1813,7 +1824,7 @@
           <a:p>
             <a:fld id="{B304424B-6627-481F-B88A-69358BD4EC9F}" type="datetimeFigureOut">
               <a:rPr lang="en-US" smtClean="0"/>
-              <a:t>10/2/2017</a:t>
+              <a:t>10/7/2017</a:t>
             </a:fld>
             <a:endParaRPr lang="en-US"/>
           </a:p>
@@ -1954,7 +1965,7 @@
           <a:p>
             <a:fld id="{B304424B-6627-481F-B88A-69358BD4EC9F}" type="datetimeFigureOut">
               <a:rPr lang="en-US" smtClean="0"/>
-              <a:t>10/2/2017</a:t>
+              <a:t>10/7/2017</a:t>
             </a:fld>
             <a:endParaRPr lang="en-US"/>
           </a:p>
@@ -2067,7 +2078,7 @@
           <a:p>
             <a:fld id="{B304424B-6627-481F-B88A-69358BD4EC9F}" type="datetimeFigureOut">
               <a:rPr lang="en-US" smtClean="0"/>
-              <a:t>10/2/2017</a:t>
+              <a:t>10/7/2017</a:t>
             </a:fld>
             <a:endParaRPr lang="en-US"/>
           </a:p>
@@ -2378,7 +2389,7 @@
           <a:p>
             <a:fld id="{B304424B-6627-481F-B88A-69358BD4EC9F}" type="datetimeFigureOut">
               <a:rPr lang="en-US" smtClean="0"/>
-              <a:t>10/2/2017</a:t>
+              <a:t>10/7/2017</a:t>
             </a:fld>
             <a:endParaRPr lang="en-US"/>
           </a:p>
@@ -2666,7 +2677,7 @@
           <a:p>
             <a:fld id="{B304424B-6627-481F-B88A-69358BD4EC9F}" type="datetimeFigureOut">
               <a:rPr lang="en-US" smtClean="0"/>
-              <a:t>10/2/2017</a:t>
+              <a:t>10/7/2017</a:t>
             </a:fld>
             <a:endParaRPr lang="en-US"/>
           </a:p>
@@ -2907,7 +2918,7 @@
           <a:p>
             <a:fld id="{B304424B-6627-481F-B88A-69358BD4EC9F}" type="datetimeFigureOut">
               <a:rPr lang="en-US" smtClean="0"/>
-              <a:t>10/2/2017</a:t>
+              <a:t>10/7/2017</a:t>
             </a:fld>
             <a:endParaRPr lang="en-US"/>
           </a:p>
@@ -3530,10 +3541,10 @@
       </p:grpSpPr>
       <p:sp>
         <p:nvSpPr>
-          <p:cNvPr id="2" name="Title 1">
-            <a:extLst>
-              <a:ext uri="{FF2B5EF4-FFF2-40B4-BE49-F238E27FC236}">
-                <a16:creationId xmlns:a16="http://schemas.microsoft.com/office/drawing/2014/main" id="{01AED332-E357-43C5-AEFC-FE9A117DE372}"/>
+          <p:cNvPr id="7" name="Title 6">
+            <a:extLst>
+              <a:ext uri="{FF2B5EF4-FFF2-40B4-BE49-F238E27FC236}">
+                <a16:creationId xmlns:a16="http://schemas.microsoft.com/office/drawing/2014/main" id="{4898AD10-BCC2-4E90-BAB5-40E2F464E399}"/>
               </a:ext>
             </a:extLst>
           </p:cNvPr>
@@ -3549,32 +3560,176 @@
           <a:bodyPr/>
           <a:lstStyle/>
           <a:p>
-            <a:endParaRPr lang="en-US" dirty="0"/>
-          </a:p>
-        </p:txBody>
-      </p:sp>
-      <p:sp>
-        <p:nvSpPr>
-          <p:cNvPr id="3" name="Content Placeholder 2">
-            <a:extLst>
-              <a:ext uri="{FF2B5EF4-FFF2-40B4-BE49-F238E27FC236}">
-                <a16:creationId xmlns:a16="http://schemas.microsoft.com/office/drawing/2014/main" id="{8A3370ED-1252-4161-BD36-80C552B184E9}"/>
-              </a:ext>
-            </a:extLst>
-          </p:cNvPr>
-          <p:cNvSpPr>
-            <a:spLocks noGrp="1"/>
-          </p:cNvSpPr>
-          <p:nvPr>
-            <p:ph idx="1"/>
-          </p:nvPr>
-        </p:nvSpPr>
-        <p:spPr/>
-        <p:txBody>
-          <a:bodyPr/>
-          <a:lstStyle/>
-          <a:p>
-            <a:endParaRPr lang="en-US"/>
+            <a:r>
+              <a:rPr lang="en-US" b="1" dirty="0"/>
+              <a:t>Enumerable</a:t>
+            </a:r>
+            <a:r>
+              <a:rPr lang="en-US" dirty="0"/>
+              <a:t>	</a:t>
+            </a:r>
+          </a:p>
+        </p:txBody>
+      </p:sp>
+      <p:sp>
+        <p:nvSpPr>
+          <p:cNvPr id="8" name="Text Placeholder 7">
+            <a:extLst>
+              <a:ext uri="{FF2B5EF4-FFF2-40B4-BE49-F238E27FC236}">
+                <a16:creationId xmlns:a16="http://schemas.microsoft.com/office/drawing/2014/main" id="{2A32275D-B0F6-440E-89C0-E09FE16AD729}"/>
+              </a:ext>
+            </a:extLst>
+          </p:cNvPr>
+          <p:cNvSpPr>
+            <a:spLocks noGrp="1"/>
+          </p:cNvSpPr>
+          <p:nvPr>
+            <p:ph type="body" idx="1"/>
+          </p:nvPr>
+        </p:nvSpPr>
+        <p:spPr/>
+        <p:txBody>
+          <a:bodyPr/>
+          <a:lstStyle/>
+          <a:p>
+            <a:r>
+              <a:rPr lang="en-US" dirty="0" err="1">
+                <a:solidFill>
+                  <a:srgbClr val="FF0000"/>
+                </a:solidFill>
+              </a:rPr>
+              <a:t>IEnumerable</a:t>
+            </a:r>
+            <a:endParaRPr lang="en-US" dirty="0">
+              <a:solidFill>
+                <a:srgbClr val="FF0000"/>
+              </a:solidFill>
+            </a:endParaRPr>
+          </a:p>
+        </p:txBody>
+      </p:sp>
+      <p:sp>
+        <p:nvSpPr>
+          <p:cNvPr id="9" name="Content Placeholder 8">
+            <a:extLst>
+              <a:ext uri="{FF2B5EF4-FFF2-40B4-BE49-F238E27FC236}">
+                <a16:creationId xmlns:a16="http://schemas.microsoft.com/office/drawing/2014/main" id="{7E7318C3-DBC8-4A53-BAC6-12E2C5FCBDC6}"/>
+              </a:ext>
+            </a:extLst>
+          </p:cNvPr>
+          <p:cNvSpPr>
+            <a:spLocks noGrp="1"/>
+          </p:cNvSpPr>
+          <p:nvPr>
+            <p:ph sz="half" idx="2"/>
+          </p:nvPr>
+        </p:nvSpPr>
+        <p:spPr/>
+        <p:txBody>
+          <a:bodyPr/>
+          <a:lstStyle/>
+          <a:p>
+            <a:r>
+              <a:rPr lang="en-US" dirty="0"/>
+              <a:t>Collection</a:t>
+            </a:r>
+          </a:p>
+          <a:p>
+            <a:r>
+              <a:rPr lang="en-US" dirty="0"/>
+              <a:t>Items</a:t>
+            </a:r>
+          </a:p>
+          <a:p>
+            <a:r>
+              <a:rPr lang="en-US" dirty="0" err="1"/>
+              <a:t>GetEnumerator</a:t>
+            </a:r>
+            <a:r>
+              <a:rPr lang="en-US" dirty="0"/>
+              <a:t>()</a:t>
+            </a:r>
+          </a:p>
+        </p:txBody>
+      </p:sp>
+      <p:sp>
+        <p:nvSpPr>
+          <p:cNvPr id="10" name="Text Placeholder 9">
+            <a:extLst>
+              <a:ext uri="{FF2B5EF4-FFF2-40B4-BE49-F238E27FC236}">
+                <a16:creationId xmlns:a16="http://schemas.microsoft.com/office/drawing/2014/main" id="{4A479125-0C13-4E11-940E-2CBB62ACB93D}"/>
+              </a:ext>
+            </a:extLst>
+          </p:cNvPr>
+          <p:cNvSpPr>
+            <a:spLocks noGrp="1"/>
+          </p:cNvSpPr>
+          <p:nvPr>
+            <p:ph type="body" sz="quarter" idx="3"/>
+          </p:nvPr>
+        </p:nvSpPr>
+        <p:spPr/>
+        <p:txBody>
+          <a:bodyPr/>
+          <a:lstStyle/>
+          <a:p>
+            <a:r>
+              <a:rPr lang="en-US" dirty="0" err="1">
+                <a:solidFill>
+                  <a:srgbClr val="FF0000"/>
+                </a:solidFill>
+              </a:rPr>
+              <a:t>IEnumerator</a:t>
+            </a:r>
+            <a:endParaRPr lang="en-US" dirty="0">
+              <a:solidFill>
+                <a:srgbClr val="FF0000"/>
+              </a:solidFill>
+            </a:endParaRPr>
+          </a:p>
+        </p:txBody>
+      </p:sp>
+      <p:sp>
+        <p:nvSpPr>
+          <p:cNvPr id="11" name="Content Placeholder 10">
+            <a:extLst>
+              <a:ext uri="{FF2B5EF4-FFF2-40B4-BE49-F238E27FC236}">
+                <a16:creationId xmlns:a16="http://schemas.microsoft.com/office/drawing/2014/main" id="{D205DE3F-2637-48AC-B4AF-E341A94FF7E4}"/>
+              </a:ext>
+            </a:extLst>
+          </p:cNvPr>
+          <p:cNvSpPr>
+            <a:spLocks noGrp="1"/>
+          </p:cNvSpPr>
+          <p:nvPr>
+            <p:ph sz="quarter" idx="4"/>
+          </p:nvPr>
+        </p:nvSpPr>
+        <p:spPr/>
+        <p:txBody>
+          <a:bodyPr/>
+          <a:lstStyle/>
+          <a:p>
+            <a:r>
+              <a:rPr lang="en-US" dirty="0"/>
+              <a:t>Iterator</a:t>
+            </a:r>
+          </a:p>
+          <a:p>
+            <a:r>
+              <a:rPr lang="en-US" dirty="0"/>
+              <a:t>Current item</a:t>
+            </a:r>
+          </a:p>
+          <a:p>
+            <a:r>
+              <a:rPr lang="en-US" dirty="0" err="1"/>
+              <a:t>MoveNext</a:t>
+            </a:r>
+            <a:r>
+              <a:rPr lang="en-US" dirty="0"/>
+              <a:t>()</a:t>
+            </a:r>
           </a:p>
         </p:txBody>
       </p:sp>
@@ -3582,6 +3737,243 @@
     <p:extLst>
       <p:ext uri="{BB962C8B-B14F-4D97-AF65-F5344CB8AC3E}">
         <p14:creationId xmlns:p14="http://schemas.microsoft.com/office/powerpoint/2010/main" val="1595967660"/>
+      </p:ext>
+    </p:extLst>
+  </p:cSld>
+  <p:clrMapOvr>
+    <a:masterClrMapping/>
+  </p:clrMapOvr>
+</p:sld>
+</file>
+
+<file path=ppt/slides/slide3.xml><?xml version="1.0" encoding="utf-8"?>
+<p:sld xmlns:a="http://schemas.openxmlformats.org/drawingml/2006/main" xmlns:r="http://schemas.openxmlformats.org/officeDocument/2006/relationships" xmlns:p="http://schemas.openxmlformats.org/presentationml/2006/main">
+  <p:cSld>
+    <p:spTree>
+      <p:nvGrpSpPr>
+        <p:cNvPr id="1" name=""/>
+        <p:cNvGrpSpPr/>
+        <p:nvPr/>
+      </p:nvGrpSpPr>
+      <p:grpSpPr>
+        <a:xfrm>
+          <a:off x="0" y="0"/>
+          <a:ext cx="0" cy="0"/>
+          <a:chOff x="0" y="0"/>
+          <a:chExt cx="0" cy="0"/>
+        </a:xfrm>
+      </p:grpSpPr>
+      <p:sp>
+        <p:nvSpPr>
+          <p:cNvPr id="7" name="Title 6">
+            <a:extLst>
+              <a:ext uri="{FF2B5EF4-FFF2-40B4-BE49-F238E27FC236}">
+                <a16:creationId xmlns:a16="http://schemas.microsoft.com/office/drawing/2014/main" id="{7F4D5589-9E97-430F-B03D-01D590BAC1A3}"/>
+              </a:ext>
+            </a:extLst>
+          </p:cNvPr>
+          <p:cNvSpPr>
+            <a:spLocks noGrp="1"/>
+          </p:cNvSpPr>
+          <p:nvPr>
+            <p:ph type="title"/>
+          </p:nvPr>
+        </p:nvSpPr>
+        <p:spPr/>
+        <p:txBody>
+          <a:bodyPr/>
+          <a:lstStyle/>
+          <a:p>
+            <a:r>
+              <a:rPr lang="en-US" b="1" dirty="0"/>
+              <a:t>Common</a:t>
+            </a:r>
+            <a:r>
+              <a:rPr lang="en-US" dirty="0"/>
+              <a:t> </a:t>
+            </a:r>
+            <a:r>
+              <a:rPr lang="en-US" b="1" strike="sngStrike" dirty="0">
+                <a:solidFill>
+                  <a:srgbClr val="FF0000"/>
+                </a:solidFill>
+              </a:rPr>
+              <a:t>mistakes</a:t>
+            </a:r>
+          </a:p>
+        </p:txBody>
+      </p:sp>
+      <p:sp>
+        <p:nvSpPr>
+          <p:cNvPr id="8" name="Content Placeholder 7">
+            <a:extLst>
+              <a:ext uri="{FF2B5EF4-FFF2-40B4-BE49-F238E27FC236}">
+                <a16:creationId xmlns:a16="http://schemas.microsoft.com/office/drawing/2014/main" id="{3C2FE290-FF0E-4A74-97B1-BAEC33E606D5}"/>
+              </a:ext>
+            </a:extLst>
+          </p:cNvPr>
+          <p:cNvSpPr>
+            <a:spLocks noGrp="1"/>
+          </p:cNvSpPr>
+          <p:nvPr>
+            <p:ph idx="1"/>
+          </p:nvPr>
+        </p:nvSpPr>
+        <p:spPr/>
+        <p:txBody>
+          <a:bodyPr/>
+          <a:lstStyle/>
+          <a:p>
+            <a:r>
+              <a:rPr lang="en-US" dirty="0"/>
+              <a:t>Late Evaluation</a:t>
+            </a:r>
+          </a:p>
+          <a:p>
+            <a:r>
+              <a:rPr lang="en-US" dirty="0"/>
+              <a:t>Multiple Evaluation</a:t>
+            </a:r>
+          </a:p>
+          <a:p>
+            <a:r>
+              <a:rPr lang="en-US" dirty="0"/>
+              <a:t>Instance Evaluation</a:t>
+            </a:r>
+          </a:p>
+          <a:p>
+            <a:r>
+              <a:rPr lang="en-US" dirty="0"/>
+              <a:t>Infinite Evaluation</a:t>
+            </a:r>
+          </a:p>
+          <a:p>
+            <a:r>
+              <a:rPr lang="en-US" dirty="0"/>
+              <a:t>Order Of Evaluation</a:t>
+            </a:r>
+          </a:p>
+          <a:p>
+            <a:r>
+              <a:rPr lang="en-US" dirty="0"/>
+              <a:t>Partial Evaluation</a:t>
+            </a:r>
+          </a:p>
+        </p:txBody>
+      </p:sp>
+    </p:spTree>
+    <p:extLst>
+      <p:ext uri="{BB962C8B-B14F-4D97-AF65-F5344CB8AC3E}">
+        <p14:creationId xmlns:p14="http://schemas.microsoft.com/office/powerpoint/2010/main" val="383025476"/>
+      </p:ext>
+    </p:extLst>
+  </p:cSld>
+  <p:clrMapOvr>
+    <a:masterClrMapping/>
+  </p:clrMapOvr>
+</p:sld>
+</file>
+
+<file path=ppt/slides/slide4.xml><?xml version="1.0" encoding="utf-8"?>
+<p:sld xmlns:a="http://schemas.openxmlformats.org/drawingml/2006/main" xmlns:r="http://schemas.openxmlformats.org/officeDocument/2006/relationships" xmlns:p="http://schemas.openxmlformats.org/presentationml/2006/main">
+  <p:cSld>
+    <p:spTree>
+      <p:nvGrpSpPr>
+        <p:cNvPr id="1" name=""/>
+        <p:cNvGrpSpPr/>
+        <p:nvPr/>
+      </p:nvGrpSpPr>
+      <p:grpSpPr>
+        <a:xfrm>
+          <a:off x="0" y="0"/>
+          <a:ext cx="0" cy="0"/>
+          <a:chOff x="0" y="0"/>
+          <a:chExt cx="0" cy="0"/>
+        </a:xfrm>
+      </p:grpSpPr>
+      <p:sp>
+        <p:nvSpPr>
+          <p:cNvPr id="7" name="Title 6">
+            <a:extLst>
+              <a:ext uri="{FF2B5EF4-FFF2-40B4-BE49-F238E27FC236}">
+                <a16:creationId xmlns:a16="http://schemas.microsoft.com/office/drawing/2014/main" id="{7CDEA2F1-D2D1-4DC2-A486-B1CCEF4C56A9}"/>
+              </a:ext>
+            </a:extLst>
+          </p:cNvPr>
+          <p:cNvSpPr>
+            <a:spLocks noGrp="1"/>
+          </p:cNvSpPr>
+          <p:nvPr>
+            <p:ph type="ctrTitle"/>
+          </p:nvPr>
+        </p:nvSpPr>
+        <p:spPr/>
+        <p:txBody>
+          <a:bodyPr/>
+          <a:lstStyle/>
+          <a:p>
+            <a:r>
+              <a:rPr lang="en-US" dirty="0">
+                <a:solidFill>
+                  <a:srgbClr val="FF8989"/>
+                </a:solidFill>
+              </a:rPr>
+              <a:t>Lack of </a:t>
+            </a:r>
+            <a:r>
+              <a:rPr lang="en-US" dirty="0" err="1">
+                <a:solidFill>
+                  <a:srgbClr val="FF8989"/>
+                </a:solidFill>
+              </a:rPr>
+              <a:t>UnitTests</a:t>
+            </a:r>
+            <a:r>
+              <a:rPr lang="en-US" dirty="0">
+                <a:solidFill>
+                  <a:schemeClr val="bg1">
+                    <a:lumMod val="65000"/>
+                  </a:schemeClr>
+                </a:solidFill>
+              </a:rPr>
+              <a:t> </a:t>
+            </a:r>
+            <a:r>
+              <a:rPr lang="en-US" dirty="0"/>
+              <a:t>considered harmful</a:t>
+            </a:r>
+          </a:p>
+        </p:txBody>
+      </p:sp>
+      <p:sp>
+        <p:nvSpPr>
+          <p:cNvPr id="8" name="Subtitle 7">
+            <a:extLst>
+              <a:ext uri="{FF2B5EF4-FFF2-40B4-BE49-F238E27FC236}">
+                <a16:creationId xmlns:a16="http://schemas.microsoft.com/office/drawing/2014/main" id="{E55A5A29-8558-4E89-80CB-9CC8DADBEA86}"/>
+              </a:ext>
+            </a:extLst>
+          </p:cNvPr>
+          <p:cNvSpPr>
+            <a:spLocks noGrp="1"/>
+          </p:cNvSpPr>
+          <p:nvPr>
+            <p:ph type="subTitle" idx="1"/>
+          </p:nvPr>
+        </p:nvSpPr>
+        <p:spPr/>
+        <p:txBody>
+          <a:bodyPr/>
+          <a:lstStyle/>
+          <a:p>
+            <a:endParaRPr lang="en-US"/>
+          </a:p>
+        </p:txBody>
+      </p:sp>
+    </p:spTree>
+    <p:extLst>
+      <p:ext uri="{BB962C8B-B14F-4D97-AF65-F5344CB8AC3E}">
+        <p14:creationId xmlns:p14="http://schemas.microsoft.com/office/powerpoint/2010/main" val="1165850693"/>
       </p:ext>
     </p:extLst>
   </p:cSld>

</xml_diff>

<commit_message>
added case for context example; updated ppt;
</commit_message>
<xml_diff>
--- a/IEnumerable considered harmful.pptx
+++ b/IEnumerable considered harmful.pptx
@@ -8,8 +8,11 @@
     <p:sldId id="256" r:id="rId2"/>
     <p:sldId id="257" r:id="rId3"/>
     <p:sldId id="259" r:id="rId4"/>
-    <p:sldId id="260" r:id="rId5"/>
-    <p:sldId id="258" r:id="rId6"/>
+    <p:sldId id="263" r:id="rId5"/>
+    <p:sldId id="262" r:id="rId6"/>
+    <p:sldId id="261" r:id="rId7"/>
+    <p:sldId id="260" r:id="rId8"/>
+    <p:sldId id="258" r:id="rId9"/>
   </p:sldIdLst>
   <p:sldSz cx="12192000" cy="6858000"/>
   <p:notesSz cx="6858000" cy="9144000"/>
@@ -3423,7 +3426,7 @@
             <a:r>
               <a:rPr lang="en-US" strike="sngStrike" dirty="0" err="1">
                 <a:solidFill>
-                  <a:srgbClr val="FF8989"/>
+                  <a:srgbClr val="FF0000"/>
                 </a:solidFill>
               </a:rPr>
               <a:t>GoTo</a:t>
@@ -3786,21 +3789,26 @@
           <a:lstStyle/>
           <a:p>
             <a:r>
-              <a:rPr lang="en-US" b="1" dirty="0"/>
-              <a:t>Common</a:t>
-            </a:r>
-            <a:r>
-              <a:rPr lang="en-US" dirty="0"/>
+              <a:rPr lang="sl-SI" b="1" dirty="0" err="1"/>
+              <a:t>foreach</a:t>
+            </a:r>
+            <a:r>
+              <a:rPr lang="sl-SI" b="1" dirty="0"/>
               <a:t> </a:t>
             </a:r>
             <a:r>
-              <a:rPr lang="en-US" b="1" strike="sngStrike" dirty="0">
+              <a:rPr lang="sl-SI" b="1" strike="sngStrike" dirty="0" err="1">
                 <a:solidFill>
                   <a:srgbClr val="FF0000"/>
                 </a:solidFill>
               </a:rPr>
-              <a:t>mistakes</a:t>
-            </a:r>
+              <a:t>actually</a:t>
+            </a:r>
+            <a:endParaRPr lang="en-US" b="1" strike="sngStrike" dirty="0">
+              <a:solidFill>
+                <a:srgbClr val="FF0000"/>
+              </a:solidFill>
+            </a:endParaRPr>
           </a:p>
         </p:txBody>
       </p:sp>
@@ -3825,43 +3833,43 @@
           <a:bodyPr/>
           <a:lstStyle/>
           <a:p>
-            <a:r>
-              <a:rPr lang="en-US" dirty="0"/>
-              <a:t>Late Evaluation</a:t>
-            </a:r>
-          </a:p>
-          <a:p>
-            <a:r>
-              <a:rPr lang="en-US" dirty="0"/>
-              <a:t>Multiple Evaluation</a:t>
-            </a:r>
-          </a:p>
-          <a:p>
-            <a:r>
-              <a:rPr lang="en-US" dirty="0"/>
-              <a:t>Instance Evaluation</a:t>
-            </a:r>
-          </a:p>
-          <a:p>
-            <a:r>
-              <a:rPr lang="en-US" dirty="0"/>
-              <a:t>Infinite Evaluation</a:t>
-            </a:r>
-          </a:p>
-          <a:p>
-            <a:r>
-              <a:rPr lang="en-US" dirty="0"/>
-              <a:t>Order Of Evaluation</a:t>
-            </a:r>
-          </a:p>
-          <a:p>
-            <a:r>
-              <a:rPr lang="en-US" dirty="0"/>
-              <a:t>Partial Evaluation</a:t>
-            </a:r>
-          </a:p>
-        </p:txBody>
-      </p:sp>
+            <a:pPr marL="0" indent="0">
+              <a:buNone/>
+            </a:pPr>
+            <a:endParaRPr lang="en-US" i="1" dirty="0"/>
+          </a:p>
+        </p:txBody>
+      </p:sp>
+      <p:pic>
+        <p:nvPicPr>
+          <p:cNvPr id="2" name="Picture 1">
+            <a:extLst>
+              <a:ext uri="{FF2B5EF4-FFF2-40B4-BE49-F238E27FC236}">
+                <a16:creationId xmlns:a16="http://schemas.microsoft.com/office/drawing/2014/main" id="{27D86BDE-E180-4CAE-B656-FC20121691A2}"/>
+              </a:ext>
+            </a:extLst>
+          </p:cNvPr>
+          <p:cNvPicPr>
+            <a:picLocks noChangeAspect="1"/>
+          </p:cNvPicPr>
+          <p:nvPr/>
+        </p:nvPicPr>
+        <p:blipFill>
+          <a:blip r:embed="rId2"/>
+          <a:stretch>
+            <a:fillRect/>
+          </a:stretch>
+        </p:blipFill>
+        <p:spPr>
+          <a:xfrm>
+            <a:off x="838200" y="2308225"/>
+            <a:ext cx="6057900" cy="3386138"/>
+          </a:xfrm>
+          <a:prstGeom prst="rect">
+            <a:avLst/>
+          </a:prstGeom>
+        </p:spPr>
+      </p:pic>
     </p:spTree>
     <p:extLst>
       <p:ext uri="{BB962C8B-B14F-4D97-AF65-F5344CB8AC3E}">
@@ -3914,22 +3922,22 @@
           <a:lstStyle/>
           <a:p>
             <a:r>
-              <a:rPr lang="sl-SI" b="1" dirty="0" err="1" smtClean="0"/>
-              <a:t>Lessons</a:t>
-            </a:r>
-            <a:r>
-              <a:rPr lang="en-US" dirty="0" smtClean="0"/>
+              <a:rPr lang="sl-SI" b="1" dirty="0" err="1"/>
+              <a:t>foreach</a:t>
+            </a:r>
+            <a:r>
+              <a:rPr lang="sl-SI" b="1" dirty="0"/>
               <a:t> </a:t>
             </a:r>
             <a:r>
-              <a:rPr lang="sl-SI" b="1" strike="sngStrike" dirty="0" err="1" smtClean="0">
+              <a:rPr lang="sl-SI" b="1" dirty="0" err="1">
                 <a:solidFill>
                   <a:srgbClr val="FF0000"/>
                 </a:solidFill>
               </a:rPr>
-              <a:t>learned</a:t>
-            </a:r>
-            <a:endParaRPr lang="en-US" b="1" strike="sngStrike" dirty="0">
+              <a:t>actually</a:t>
+            </a:r>
+            <a:endParaRPr lang="en-US" b="1" dirty="0">
               <a:solidFill>
                 <a:srgbClr val="FF0000"/>
               </a:solidFill>
@@ -3958,56 +3966,47 @@
           <a:bodyPr/>
           <a:lstStyle/>
           <a:p>
-            <a:r>
-              <a:rPr lang="en-US" dirty="0" smtClean="0"/>
-              <a:t>When enumerable is evaluated</a:t>
-            </a:r>
-          </a:p>
-          <a:p>
-            <a:r>
-              <a:rPr lang="en-US" dirty="0" smtClean="0"/>
-              <a:t>Re-evaluation happens</a:t>
-            </a:r>
-          </a:p>
-          <a:p>
-            <a:r>
-              <a:rPr lang="en-US" dirty="0" smtClean="0"/>
-              <a:t>Re-evaluation returns new instances</a:t>
-            </a:r>
-          </a:p>
-          <a:p>
-            <a:r>
-              <a:rPr lang="en-US" dirty="0" smtClean="0"/>
-              <a:t>Infinite sequences</a:t>
-            </a:r>
-          </a:p>
-          <a:p>
-            <a:r>
-              <a:rPr lang="en-US" dirty="0" smtClean="0"/>
-              <a:t>Context may </a:t>
-            </a:r>
-            <a:r>
-              <a:rPr lang="en-US" dirty="0" smtClean="0"/>
-              <a:t>v</a:t>
-            </a:r>
-            <a:r>
-              <a:rPr lang="en-US" dirty="0" smtClean="0"/>
-              <a:t>ary</a:t>
-            </a:r>
-          </a:p>
-          <a:p>
-            <a:r>
-              <a:rPr lang="en-US" dirty="0" smtClean="0"/>
-              <a:t>Side effects best be avoided</a:t>
-            </a:r>
-            <a:endParaRPr lang="en-US" dirty="0"/>
-          </a:p>
-        </p:txBody>
-      </p:sp>
+            <a:pPr marL="0" indent="0">
+              <a:buNone/>
+            </a:pPr>
+            <a:endParaRPr lang="en-US" i="1" dirty="0"/>
+          </a:p>
+        </p:txBody>
+      </p:sp>
+      <p:pic>
+        <p:nvPicPr>
+          <p:cNvPr id="3" name="Picture 2">
+            <a:extLst>
+              <a:ext uri="{FF2B5EF4-FFF2-40B4-BE49-F238E27FC236}">
+                <a16:creationId xmlns:a16="http://schemas.microsoft.com/office/drawing/2014/main" id="{5A58A55F-1A63-478A-83C7-40F005560213}"/>
+              </a:ext>
+            </a:extLst>
+          </p:cNvPr>
+          <p:cNvPicPr>
+            <a:picLocks noChangeAspect="1"/>
+          </p:cNvPicPr>
+          <p:nvPr/>
+        </p:nvPicPr>
+        <p:blipFill>
+          <a:blip r:embed="rId2"/>
+          <a:stretch>
+            <a:fillRect/>
+          </a:stretch>
+        </p:blipFill>
+        <p:spPr>
+          <a:xfrm>
+            <a:off x="919885" y="2209079"/>
+            <a:ext cx="5857875" cy="3529013"/>
+          </a:xfrm>
+          <a:prstGeom prst="rect">
+            <a:avLst/>
+          </a:prstGeom>
+        </p:spPr>
+      </p:pic>
     </p:spTree>
     <p:extLst>
       <p:ext uri="{BB962C8B-B14F-4D97-AF65-F5344CB8AC3E}">
-        <p14:creationId xmlns:p14="http://schemas.microsoft.com/office/powerpoint/2010/main" val="1644988062"/>
+        <p14:creationId xmlns:p14="http://schemas.microsoft.com/office/powerpoint/2010/main" val="3847930389"/>
       </p:ext>
     </p:extLst>
   </p:cSld>
@@ -4039,6 +4038,476 @@
           <p:cNvPr id="7" name="Title 6">
             <a:extLst>
               <a:ext uri="{FF2B5EF4-FFF2-40B4-BE49-F238E27FC236}">
+                <a16:creationId xmlns:a16="http://schemas.microsoft.com/office/drawing/2014/main" id="{7F4D5589-9E97-430F-B03D-01D590BAC1A3}"/>
+              </a:ext>
+            </a:extLst>
+          </p:cNvPr>
+          <p:cNvSpPr>
+            <a:spLocks noGrp="1"/>
+          </p:cNvSpPr>
+          <p:nvPr>
+            <p:ph type="title"/>
+          </p:nvPr>
+        </p:nvSpPr>
+        <p:spPr/>
+        <p:txBody>
+          <a:bodyPr/>
+          <a:lstStyle/>
+          <a:p>
+            <a:r>
+              <a:rPr lang="sl-SI" b="1" dirty="0" err="1"/>
+              <a:t>foreach</a:t>
+            </a:r>
+            <a:r>
+              <a:rPr lang="sl-SI" b="1" dirty="0"/>
+              <a:t> </a:t>
+            </a:r>
+            <a:r>
+              <a:rPr lang="sl-SI" b="1" dirty="0" err="1"/>
+              <a:t>vs</a:t>
+            </a:r>
+            <a:r>
+              <a:rPr lang="sl-SI" b="1" dirty="0"/>
+              <a:t> </a:t>
+            </a:r>
+            <a:r>
+              <a:rPr lang="sl-SI" b="1" strike="sngStrike" dirty="0" err="1">
+                <a:solidFill>
+                  <a:srgbClr val="FF0000"/>
+                </a:solidFill>
+              </a:rPr>
+              <a:t>ForEach</a:t>
+            </a:r>
+            <a:r>
+              <a:rPr lang="sl-SI" b="1" strike="sngStrike" dirty="0">
+                <a:solidFill>
+                  <a:srgbClr val="FF0000"/>
+                </a:solidFill>
+              </a:rPr>
+              <a:t>()</a:t>
+            </a:r>
+            <a:endParaRPr lang="en-US" b="1" strike="sngStrike" dirty="0">
+              <a:solidFill>
+                <a:srgbClr val="FF0000"/>
+              </a:solidFill>
+            </a:endParaRPr>
+          </a:p>
+        </p:txBody>
+      </p:sp>
+      <p:sp>
+        <p:nvSpPr>
+          <p:cNvPr id="8" name="Content Placeholder 7">
+            <a:extLst>
+              <a:ext uri="{FF2B5EF4-FFF2-40B4-BE49-F238E27FC236}">
+                <a16:creationId xmlns:a16="http://schemas.microsoft.com/office/drawing/2014/main" id="{3C2FE290-FF0E-4A74-97B1-BAEC33E606D5}"/>
+              </a:ext>
+            </a:extLst>
+          </p:cNvPr>
+          <p:cNvSpPr>
+            <a:spLocks noGrp="1"/>
+          </p:cNvSpPr>
+          <p:nvPr>
+            <p:ph idx="1"/>
+          </p:nvPr>
+        </p:nvSpPr>
+        <p:spPr/>
+        <p:txBody>
+          <a:bodyPr/>
+          <a:lstStyle/>
+          <a:p>
+            <a:pPr marL="0" indent="0">
+              <a:buNone/>
+            </a:pPr>
+            <a:r>
+              <a:rPr lang="sl-SI" dirty="0"/>
+              <a:t>„</a:t>
+            </a:r>
+            <a:r>
+              <a:rPr lang="en-GB" dirty="0"/>
+              <a:t>The first reason is that doing so</a:t>
+            </a:r>
+            <a:r>
+              <a:rPr lang="sl-SI" dirty="0"/>
+              <a:t> (</a:t>
+            </a:r>
+            <a:r>
+              <a:rPr lang="sl-SI" i="1" dirty="0" err="1"/>
+              <a:t>ForEach</a:t>
+            </a:r>
+            <a:r>
+              <a:rPr lang="sl-SI" i="1" dirty="0"/>
+              <a:t>()</a:t>
+            </a:r>
+            <a:r>
+              <a:rPr lang="sl-SI" dirty="0"/>
+              <a:t>)</a:t>
+            </a:r>
+            <a:r>
+              <a:rPr lang="en-GB" dirty="0"/>
+              <a:t> violates the functional programming principles that all the other sequence operators are based upon. Clearly </a:t>
+            </a:r>
+            <a:r>
+              <a:rPr lang="en-GB" b="1" dirty="0"/>
+              <a:t>the sole purpose of a call to this method is to cause side effects.</a:t>
+            </a:r>
+            <a:r>
+              <a:rPr lang="sl-SI" dirty="0"/>
+              <a:t>“</a:t>
+            </a:r>
+          </a:p>
+          <a:p>
+            <a:pPr marL="0" indent="0">
+              <a:buNone/>
+            </a:pPr>
+            <a:endParaRPr lang="sl-SI" i="1" dirty="0"/>
+          </a:p>
+          <a:p>
+            <a:pPr marL="0" indent="0">
+              <a:buNone/>
+            </a:pPr>
+            <a:r>
+              <a:rPr lang="sl-SI" i="1" dirty="0"/>
+              <a:t>								Eric </a:t>
+            </a:r>
+            <a:r>
+              <a:rPr lang="sl-SI" i="1" dirty="0" err="1"/>
+              <a:t>Lippert</a:t>
+            </a:r>
+            <a:endParaRPr lang="en-US" i="1" dirty="0"/>
+          </a:p>
+        </p:txBody>
+      </p:sp>
+    </p:spTree>
+    <p:extLst>
+      <p:ext uri="{BB962C8B-B14F-4D97-AF65-F5344CB8AC3E}">
+        <p14:creationId xmlns:p14="http://schemas.microsoft.com/office/powerpoint/2010/main" val="484641060"/>
+      </p:ext>
+    </p:extLst>
+  </p:cSld>
+  <p:clrMapOvr>
+    <a:masterClrMapping/>
+  </p:clrMapOvr>
+</p:sld>
+</file>
+
+<file path=ppt/slides/slide6.xml><?xml version="1.0" encoding="utf-8"?>
+<p:sld xmlns:a="http://schemas.openxmlformats.org/drawingml/2006/main" xmlns:r="http://schemas.openxmlformats.org/officeDocument/2006/relationships" xmlns:p="http://schemas.openxmlformats.org/presentationml/2006/main">
+  <p:cSld>
+    <p:spTree>
+      <p:nvGrpSpPr>
+        <p:cNvPr id="1" name=""/>
+        <p:cNvGrpSpPr/>
+        <p:nvPr/>
+      </p:nvGrpSpPr>
+      <p:grpSpPr>
+        <a:xfrm>
+          <a:off x="0" y="0"/>
+          <a:ext cx="0" cy="0"/>
+          <a:chOff x="0" y="0"/>
+          <a:chExt cx="0" cy="0"/>
+        </a:xfrm>
+      </p:grpSpPr>
+      <p:sp>
+        <p:nvSpPr>
+          <p:cNvPr id="7" name="Title 6">
+            <a:extLst>
+              <a:ext uri="{FF2B5EF4-FFF2-40B4-BE49-F238E27FC236}">
+                <a16:creationId xmlns:a16="http://schemas.microsoft.com/office/drawing/2014/main" id="{7F4D5589-9E97-430F-B03D-01D590BAC1A3}"/>
+              </a:ext>
+            </a:extLst>
+          </p:cNvPr>
+          <p:cNvSpPr>
+            <a:spLocks noGrp="1"/>
+          </p:cNvSpPr>
+          <p:nvPr>
+            <p:ph type="title"/>
+          </p:nvPr>
+        </p:nvSpPr>
+        <p:spPr/>
+        <p:txBody>
+          <a:bodyPr/>
+          <a:lstStyle/>
+          <a:p>
+            <a:r>
+              <a:rPr lang="en-US" b="1" dirty="0"/>
+              <a:t>Common</a:t>
+            </a:r>
+            <a:r>
+              <a:rPr lang="en-US" dirty="0"/>
+              <a:t> </a:t>
+            </a:r>
+            <a:r>
+              <a:rPr lang="en-US" b="1" strike="sngStrike" dirty="0">
+                <a:solidFill>
+                  <a:srgbClr val="FF0000"/>
+                </a:solidFill>
+              </a:rPr>
+              <a:t>mistakes</a:t>
+            </a:r>
+          </a:p>
+        </p:txBody>
+      </p:sp>
+      <p:sp>
+        <p:nvSpPr>
+          <p:cNvPr id="8" name="Content Placeholder 7">
+            <a:extLst>
+              <a:ext uri="{FF2B5EF4-FFF2-40B4-BE49-F238E27FC236}">
+                <a16:creationId xmlns:a16="http://schemas.microsoft.com/office/drawing/2014/main" id="{3C2FE290-FF0E-4A74-97B1-BAEC33E606D5}"/>
+              </a:ext>
+            </a:extLst>
+          </p:cNvPr>
+          <p:cNvSpPr>
+            <a:spLocks noGrp="1"/>
+          </p:cNvSpPr>
+          <p:nvPr>
+            <p:ph idx="1"/>
+          </p:nvPr>
+        </p:nvSpPr>
+        <p:spPr/>
+        <p:txBody>
+          <a:bodyPr/>
+          <a:lstStyle/>
+          <a:p>
+            <a:r>
+              <a:rPr lang="en-US" dirty="0"/>
+              <a:t>Late Evaluation</a:t>
+            </a:r>
+          </a:p>
+          <a:p>
+            <a:r>
+              <a:rPr lang="en-US" dirty="0"/>
+              <a:t>Multiple Evaluation</a:t>
+            </a:r>
+          </a:p>
+          <a:p>
+            <a:r>
+              <a:rPr lang="en-US" dirty="0"/>
+              <a:t>Instance Evaluation</a:t>
+            </a:r>
+          </a:p>
+          <a:p>
+            <a:r>
+              <a:rPr lang="en-US" dirty="0"/>
+              <a:t>Infinite Evaluation</a:t>
+            </a:r>
+          </a:p>
+          <a:p>
+            <a:r>
+              <a:rPr lang="en-US" dirty="0"/>
+              <a:t>Order Of Evaluation</a:t>
+            </a:r>
+          </a:p>
+          <a:p>
+            <a:r>
+              <a:rPr lang="en-US" dirty="0"/>
+              <a:t>Partial Evaluation</a:t>
+            </a:r>
+          </a:p>
+        </p:txBody>
+      </p:sp>
+    </p:spTree>
+    <p:extLst>
+      <p:ext uri="{BB962C8B-B14F-4D97-AF65-F5344CB8AC3E}">
+        <p14:creationId xmlns:p14="http://schemas.microsoft.com/office/powerpoint/2010/main" val="539935801"/>
+      </p:ext>
+    </p:extLst>
+  </p:cSld>
+  <p:clrMapOvr>
+    <a:masterClrMapping/>
+  </p:clrMapOvr>
+</p:sld>
+</file>
+
+<file path=ppt/slides/slide7.xml><?xml version="1.0" encoding="utf-8"?>
+<p:sld xmlns:a="http://schemas.openxmlformats.org/drawingml/2006/main" xmlns:r="http://schemas.openxmlformats.org/officeDocument/2006/relationships" xmlns:p="http://schemas.openxmlformats.org/presentationml/2006/main">
+  <p:cSld>
+    <p:spTree>
+      <p:nvGrpSpPr>
+        <p:cNvPr id="1" name=""/>
+        <p:cNvGrpSpPr/>
+        <p:nvPr/>
+      </p:nvGrpSpPr>
+      <p:grpSpPr>
+        <a:xfrm>
+          <a:off x="0" y="0"/>
+          <a:ext cx="0" cy="0"/>
+          <a:chOff x="0" y="0"/>
+          <a:chExt cx="0" cy="0"/>
+        </a:xfrm>
+      </p:grpSpPr>
+      <p:sp>
+        <p:nvSpPr>
+          <p:cNvPr id="7" name="Title 6">
+            <a:extLst>
+              <a:ext uri="{FF2B5EF4-FFF2-40B4-BE49-F238E27FC236}">
+                <a16:creationId xmlns:a16="http://schemas.microsoft.com/office/drawing/2014/main" id="{7F4D5589-9E97-430F-B03D-01D590BAC1A3}"/>
+              </a:ext>
+            </a:extLst>
+          </p:cNvPr>
+          <p:cNvSpPr>
+            <a:spLocks noGrp="1"/>
+          </p:cNvSpPr>
+          <p:nvPr>
+            <p:ph type="title"/>
+          </p:nvPr>
+        </p:nvSpPr>
+        <p:spPr/>
+        <p:txBody>
+          <a:bodyPr/>
+          <a:lstStyle/>
+          <a:p>
+            <a:r>
+              <a:rPr lang="sl-SI" b="1" dirty="0" err="1"/>
+              <a:t>Lessons</a:t>
+            </a:r>
+            <a:r>
+              <a:rPr lang="en-US" dirty="0"/>
+              <a:t> </a:t>
+            </a:r>
+            <a:r>
+              <a:rPr lang="sl-SI" b="1" strike="sngStrike" dirty="0" err="1">
+                <a:solidFill>
+                  <a:srgbClr val="FF0000"/>
+                </a:solidFill>
+              </a:rPr>
+              <a:t>learned</a:t>
+            </a:r>
+            <a:endParaRPr lang="en-US" b="1" strike="sngStrike" dirty="0">
+              <a:solidFill>
+                <a:srgbClr val="FF0000"/>
+              </a:solidFill>
+            </a:endParaRPr>
+          </a:p>
+        </p:txBody>
+      </p:sp>
+      <p:sp>
+        <p:nvSpPr>
+          <p:cNvPr id="8" name="Content Placeholder 7">
+            <a:extLst>
+              <a:ext uri="{FF2B5EF4-FFF2-40B4-BE49-F238E27FC236}">
+                <a16:creationId xmlns:a16="http://schemas.microsoft.com/office/drawing/2014/main" id="{3C2FE290-FF0E-4A74-97B1-BAEC33E606D5}"/>
+              </a:ext>
+            </a:extLst>
+          </p:cNvPr>
+          <p:cNvSpPr>
+            <a:spLocks noGrp="1"/>
+          </p:cNvSpPr>
+          <p:nvPr>
+            <p:ph idx="1"/>
+          </p:nvPr>
+        </p:nvSpPr>
+        <p:spPr/>
+        <p:txBody>
+          <a:bodyPr/>
+          <a:lstStyle/>
+          <a:p>
+            <a:r>
+              <a:rPr lang="sl-SI" dirty="0"/>
+              <a:t>E</a:t>
+            </a:r>
+            <a:r>
+              <a:rPr lang="en-US" dirty="0"/>
+              <a:t>numerable is </a:t>
+            </a:r>
+            <a:r>
+              <a:rPr lang="sl-SI" dirty="0"/>
+              <a:t>„</a:t>
+            </a:r>
+            <a:r>
+              <a:rPr lang="sl-SI" dirty="0" err="1"/>
+              <a:t>lazy</a:t>
+            </a:r>
+            <a:r>
+              <a:rPr lang="sl-SI" dirty="0"/>
+              <a:t>“</a:t>
+            </a:r>
+            <a:endParaRPr lang="en-US" dirty="0"/>
+          </a:p>
+          <a:p>
+            <a:r>
+              <a:rPr lang="en-US" dirty="0"/>
+              <a:t>Re-evaluation happens</a:t>
+            </a:r>
+          </a:p>
+          <a:p>
+            <a:r>
+              <a:rPr lang="en-US" dirty="0"/>
+              <a:t>Re-evaluation </a:t>
+            </a:r>
+            <a:r>
+              <a:rPr lang="sl-SI" dirty="0"/>
+              <a:t>re-</a:t>
+            </a:r>
+            <a:r>
+              <a:rPr lang="sl-SI" dirty="0" err="1"/>
+              <a:t>instantiates</a:t>
+            </a:r>
+            <a:endParaRPr lang="en-US" dirty="0"/>
+          </a:p>
+          <a:p>
+            <a:r>
+              <a:rPr lang="en-US" dirty="0"/>
+              <a:t>Infinite sequences</a:t>
+            </a:r>
+            <a:r>
+              <a:rPr lang="sl-SI" dirty="0"/>
+              <a:t> are </a:t>
+            </a:r>
+            <a:r>
+              <a:rPr lang="sl-SI" dirty="0" err="1"/>
+              <a:t>bad</a:t>
+            </a:r>
+            <a:endParaRPr lang="en-US" dirty="0"/>
+          </a:p>
+          <a:p>
+            <a:r>
+              <a:rPr lang="en-US" dirty="0"/>
+              <a:t>Context may vary</a:t>
+            </a:r>
+          </a:p>
+          <a:p>
+            <a:r>
+              <a:rPr lang="en-US" dirty="0"/>
+              <a:t>Side effects best be avoided</a:t>
+            </a:r>
+          </a:p>
+        </p:txBody>
+      </p:sp>
+    </p:spTree>
+    <p:extLst>
+      <p:ext uri="{BB962C8B-B14F-4D97-AF65-F5344CB8AC3E}">
+        <p14:creationId xmlns:p14="http://schemas.microsoft.com/office/powerpoint/2010/main" val="1644988062"/>
+      </p:ext>
+    </p:extLst>
+  </p:cSld>
+  <p:clrMapOvr>
+    <a:masterClrMapping/>
+  </p:clrMapOvr>
+</p:sld>
+</file>
+
+<file path=ppt/slides/slide8.xml><?xml version="1.0" encoding="utf-8"?>
+<p:sld xmlns:a="http://schemas.openxmlformats.org/drawingml/2006/main" xmlns:r="http://schemas.openxmlformats.org/officeDocument/2006/relationships" xmlns:p="http://schemas.openxmlformats.org/presentationml/2006/main">
+  <p:cSld>
+    <p:spTree>
+      <p:nvGrpSpPr>
+        <p:cNvPr id="1" name=""/>
+        <p:cNvGrpSpPr/>
+        <p:nvPr/>
+      </p:nvGrpSpPr>
+      <p:grpSpPr>
+        <a:xfrm>
+          <a:off x="0" y="0"/>
+          <a:ext cx="0" cy="0"/>
+          <a:chOff x="0" y="0"/>
+          <a:chExt cx="0" cy="0"/>
+        </a:xfrm>
+      </p:grpSpPr>
+      <p:sp>
+        <p:nvSpPr>
+          <p:cNvPr id="7" name="Title 6">
+            <a:extLst>
+              <a:ext uri="{FF2B5EF4-FFF2-40B4-BE49-F238E27FC236}">
                 <a16:creationId xmlns:a16="http://schemas.microsoft.com/office/drawing/2014/main" id="{7CDEA2F1-D2D1-4DC2-A486-B1CCEF4C56A9}"/>
               </a:ext>
             </a:extLst>
@@ -4058,7 +4527,7 @@
             <a:r>
               <a:rPr lang="en-US" dirty="0">
                 <a:solidFill>
-                  <a:srgbClr val="FF8989"/>
+                  <a:srgbClr val="FF0000"/>
                 </a:solidFill>
               </a:rPr>
               <a:t>Lack of </a:t>
@@ -4066,7 +4535,7 @@
             <a:r>
               <a:rPr lang="en-US" dirty="0" err="1">
                 <a:solidFill>
-                  <a:srgbClr val="FF8989"/>
+                  <a:srgbClr val="FF0000"/>
                 </a:solidFill>
               </a:rPr>
               <a:t>UnitTests</a:t>
@@ -4074,9 +4543,7 @@
             <a:r>
               <a:rPr lang="en-US" dirty="0">
                 <a:solidFill>
-                  <a:schemeClr val="bg1">
-                    <a:lumMod val="65000"/>
-                  </a:schemeClr>
+                  <a:srgbClr val="FF0000"/>
                 </a:solidFill>
               </a:rPr>
               <a:t> </a:t>

</xml_diff>

<commit_message>
Added source code url;
</commit_message>
<xml_diff>
--- a/IEnumerable considered harmful.pptx
+++ b/IEnumerable considered harmful.pptx
@@ -12,7 +12,8 @@
     <p:sldId id="262" r:id="rId6"/>
     <p:sldId id="261" r:id="rId7"/>
     <p:sldId id="260" r:id="rId8"/>
-    <p:sldId id="258" r:id="rId9"/>
+    <p:sldId id="264" r:id="rId9"/>
+    <p:sldId id="258" r:id="rId10"/>
   </p:sldIdLst>
   <p:sldSz cx="12192000" cy="6858000"/>
   <p:notesSz cx="6858000" cy="9144000"/>
@@ -272,7 +273,7 @@
           <a:p>
             <a:fld id="{B304424B-6627-481F-B88A-69358BD4EC9F}" type="datetimeFigureOut">
               <a:rPr lang="en-US" smtClean="0"/>
-              <a:t>10/9/2017</a:t>
+              <a:t>10/15/2017</a:t>
             </a:fld>
             <a:endParaRPr lang="en-US"/>
           </a:p>
@@ -470,7 +471,7 @@
           <a:p>
             <a:fld id="{B304424B-6627-481F-B88A-69358BD4EC9F}" type="datetimeFigureOut">
               <a:rPr lang="en-US" smtClean="0"/>
-              <a:t>10/9/2017</a:t>
+              <a:t>10/15/2017</a:t>
             </a:fld>
             <a:endParaRPr lang="en-US"/>
           </a:p>
@@ -678,7 +679,7 @@
           <a:p>
             <a:fld id="{B304424B-6627-481F-B88A-69358BD4EC9F}" type="datetimeFigureOut">
               <a:rPr lang="en-US" smtClean="0"/>
-              <a:t>10/9/2017</a:t>
+              <a:t>10/15/2017</a:t>
             </a:fld>
             <a:endParaRPr lang="en-US"/>
           </a:p>
@@ -876,7 +877,7 @@
           <a:p>
             <a:fld id="{B304424B-6627-481F-B88A-69358BD4EC9F}" type="datetimeFigureOut">
               <a:rPr lang="en-US" smtClean="0"/>
-              <a:t>10/9/2017</a:t>
+              <a:t>10/15/2017</a:t>
             </a:fld>
             <a:endParaRPr lang="en-US"/>
           </a:p>
@@ -1151,7 +1152,7 @@
           <a:p>
             <a:fld id="{B304424B-6627-481F-B88A-69358BD4EC9F}" type="datetimeFigureOut">
               <a:rPr lang="en-US" smtClean="0"/>
-              <a:t>10/9/2017</a:t>
+              <a:t>10/15/2017</a:t>
             </a:fld>
             <a:endParaRPr lang="en-US"/>
           </a:p>
@@ -1416,7 +1417,7 @@
           <a:p>
             <a:fld id="{B304424B-6627-481F-B88A-69358BD4EC9F}" type="datetimeFigureOut">
               <a:rPr lang="en-US" smtClean="0"/>
-              <a:t>10/9/2017</a:t>
+              <a:t>10/15/2017</a:t>
             </a:fld>
             <a:endParaRPr lang="en-US"/>
           </a:p>
@@ -1828,7 +1829,7 @@
           <a:p>
             <a:fld id="{B304424B-6627-481F-B88A-69358BD4EC9F}" type="datetimeFigureOut">
               <a:rPr lang="en-US" smtClean="0"/>
-              <a:t>10/9/2017</a:t>
+              <a:t>10/15/2017</a:t>
             </a:fld>
             <a:endParaRPr lang="en-US"/>
           </a:p>
@@ -1969,7 +1970,7 @@
           <a:p>
             <a:fld id="{B304424B-6627-481F-B88A-69358BD4EC9F}" type="datetimeFigureOut">
               <a:rPr lang="en-US" smtClean="0"/>
-              <a:t>10/9/2017</a:t>
+              <a:t>10/15/2017</a:t>
             </a:fld>
             <a:endParaRPr lang="en-US"/>
           </a:p>
@@ -2082,7 +2083,7 @@
           <a:p>
             <a:fld id="{B304424B-6627-481F-B88A-69358BD4EC9F}" type="datetimeFigureOut">
               <a:rPr lang="en-US" smtClean="0"/>
-              <a:t>10/9/2017</a:t>
+              <a:t>10/15/2017</a:t>
             </a:fld>
             <a:endParaRPr lang="en-US"/>
           </a:p>
@@ -2393,7 +2394,7 @@
           <a:p>
             <a:fld id="{B304424B-6627-481F-B88A-69358BD4EC9F}" type="datetimeFigureOut">
               <a:rPr lang="en-US" smtClean="0"/>
-              <a:t>10/9/2017</a:t>
+              <a:t>10/15/2017</a:t>
             </a:fld>
             <a:endParaRPr lang="en-US"/>
           </a:p>
@@ -2681,7 +2682,7 @@
           <a:p>
             <a:fld id="{B304424B-6627-481F-B88A-69358BD4EC9F}" type="datetimeFigureOut">
               <a:rPr lang="en-US" smtClean="0"/>
-              <a:t>10/9/2017</a:t>
+              <a:t>10/15/2017</a:t>
             </a:fld>
             <a:endParaRPr lang="en-US"/>
           </a:p>
@@ -2922,7 +2923,7 @@
           <a:p>
             <a:fld id="{B304424B-6627-481F-B88A-69358BD4EC9F}" type="datetimeFigureOut">
               <a:rPr lang="en-US" smtClean="0"/>
-              <a:t>10/9/2017</a:t>
+              <a:t>10/15/2017</a:t>
             </a:fld>
             <a:endParaRPr lang="en-US"/>
           </a:p>
@@ -4508,6 +4509,120 @@
           <p:cNvPr id="7" name="Title 6">
             <a:extLst>
               <a:ext uri="{FF2B5EF4-FFF2-40B4-BE49-F238E27FC236}">
+                <a16:creationId xmlns:a16="http://schemas.microsoft.com/office/drawing/2014/main" id="{7F4D5589-9E97-430F-B03D-01D590BAC1A3}"/>
+              </a:ext>
+            </a:extLst>
+          </p:cNvPr>
+          <p:cNvSpPr>
+            <a:spLocks noGrp="1"/>
+          </p:cNvSpPr>
+          <p:nvPr>
+            <p:ph type="title"/>
+          </p:nvPr>
+        </p:nvSpPr>
+        <p:spPr/>
+        <p:txBody>
+          <a:bodyPr/>
+          <a:lstStyle/>
+          <a:p>
+            <a:r>
+              <a:rPr lang="en-US" b="1" dirty="0" err="1"/>
+              <a:t>Source</a:t>
+            </a:r>
+            <a:r>
+              <a:rPr lang="en-US" b="1" dirty="0" err="1">
+                <a:solidFill>
+                  <a:srgbClr val="FF0000"/>
+                </a:solidFill>
+              </a:rPr>
+              <a:t>Code</a:t>
+            </a:r>
+            <a:endParaRPr lang="en-US" b="1" dirty="0">
+              <a:solidFill>
+                <a:srgbClr val="FF0000"/>
+              </a:solidFill>
+            </a:endParaRPr>
+          </a:p>
+        </p:txBody>
+      </p:sp>
+      <p:sp>
+        <p:nvSpPr>
+          <p:cNvPr id="8" name="Content Placeholder 7">
+            <a:extLst>
+              <a:ext uri="{FF2B5EF4-FFF2-40B4-BE49-F238E27FC236}">
+                <a16:creationId xmlns:a16="http://schemas.microsoft.com/office/drawing/2014/main" id="{3C2FE290-FF0E-4A74-97B1-BAEC33E606D5}"/>
+              </a:ext>
+            </a:extLst>
+          </p:cNvPr>
+          <p:cNvSpPr>
+            <a:spLocks noGrp="1"/>
+          </p:cNvSpPr>
+          <p:nvPr>
+            <p:ph idx="1"/>
+          </p:nvPr>
+        </p:nvSpPr>
+        <p:spPr/>
+        <p:txBody>
+          <a:bodyPr/>
+          <a:lstStyle/>
+          <a:p>
+            <a:pPr marL="0" indent="0">
+              <a:buNone/>
+            </a:pPr>
+            <a:r>
+              <a:rPr lang="sl-SI" dirty="0">
+                <a:hlinkClick r:id="rId2"/>
+              </a:rPr>
+              <a:t>h</a:t>
+            </a:r>
+            <a:r>
+              <a:rPr lang="sl-SI" dirty="0">
+                <a:hlinkClick r:id="rId2"/>
+              </a:rPr>
+              <a:t>ttps://github.com/GoranSiska/IEnumerableConsideredHarmful</a:t>
+            </a:r>
+            <a:endParaRPr lang="en-US" dirty="0"/>
+          </a:p>
+          <a:p>
+            <a:endParaRPr lang="en-US" dirty="0"/>
+          </a:p>
+        </p:txBody>
+      </p:sp>
+    </p:spTree>
+    <p:extLst>
+      <p:ext uri="{BB962C8B-B14F-4D97-AF65-F5344CB8AC3E}">
+        <p14:creationId xmlns:p14="http://schemas.microsoft.com/office/powerpoint/2010/main" val="480296894"/>
+      </p:ext>
+    </p:extLst>
+  </p:cSld>
+  <p:clrMapOvr>
+    <a:masterClrMapping/>
+  </p:clrMapOvr>
+</p:sld>
+</file>
+
+<file path=ppt/slides/slide9.xml><?xml version="1.0" encoding="utf-8"?>
+<p:sld xmlns:a="http://schemas.openxmlformats.org/drawingml/2006/main" xmlns:r="http://schemas.openxmlformats.org/officeDocument/2006/relationships" xmlns:p="http://schemas.openxmlformats.org/presentationml/2006/main">
+  <p:cSld>
+    <p:spTree>
+      <p:nvGrpSpPr>
+        <p:cNvPr id="1" name=""/>
+        <p:cNvGrpSpPr/>
+        <p:nvPr/>
+      </p:nvGrpSpPr>
+      <p:grpSpPr>
+        <a:xfrm>
+          <a:off x="0" y="0"/>
+          <a:ext cx="0" cy="0"/>
+          <a:chOff x="0" y="0"/>
+          <a:chExt cx="0" cy="0"/>
+        </a:xfrm>
+      </p:grpSpPr>
+      <p:sp>
+        <p:nvSpPr>
+          <p:cNvPr id="7" name="Title 6">
+            <a:extLst>
+              <a:ext uri="{FF2B5EF4-FFF2-40B4-BE49-F238E27FC236}">
                 <a16:creationId xmlns:a16="http://schemas.microsoft.com/office/drawing/2014/main" id="{7CDEA2F1-D2D1-4DC2-A486-B1CCEF4C56A9}"/>
               </a:ext>
             </a:extLst>

</xml_diff>